<commit_message>
fixed allocation implmentation and updated ppt
</commit_message>
<xml_diff>
--- a/vEB Allocation Framework.pptx
+++ b/vEB Allocation Framework.pptx
@@ -3084,9 +3084,15 @@
 <p:sldMaster xmlns:a="http://schemas.openxmlformats.org/drawingml/2006/main" xmlns:r="http://schemas.openxmlformats.org/officeDocument/2006/relationships" xmlns:p="http://schemas.openxmlformats.org/presentationml/2006/main">
   <p:cSld>
     <p:bg>
-      <p:bgRef idx="1001">
-        <a:schemeClr val="bg1"/>
-      </p:bgRef>
+      <p:bgPr>
+        <a:solidFill>
+          <a:schemeClr val="bg1">
+            <a:lumMod val="85000"/>
+            <a:lumOff val="15000"/>
+          </a:schemeClr>
+        </a:solidFill>
+        <a:effectLst/>
+      </p:bgPr>
     </p:bg>
     <p:spTree>
       <p:nvGrpSpPr>
@@ -3630,14 +3636,6 @@
 <file path=ppt/slides/slide1.xml><?xml version="1.0" encoding="utf-8"?>
 <p:sld xmlns:a="http://schemas.openxmlformats.org/drawingml/2006/main" xmlns:r="http://schemas.openxmlformats.org/officeDocument/2006/relationships" xmlns:p="http://schemas.openxmlformats.org/presentationml/2006/main">
   <p:cSld>
-    <p:bg>
-      <p:bgPr>
-        <a:solidFill>
-          <a:schemeClr val="bg1"/>
-        </a:solidFill>
-        <a:effectLst/>
-      </p:bgPr>
-    </p:bg>
     <p:spTree>
       <p:nvGrpSpPr>
         <p:cNvPr id="1" name=""/>
@@ -4175,14 +4173,6 @@
 <file path=ppt/slides/slide2.xml><?xml version="1.0" encoding="utf-8"?>
 <p:sld xmlns:a="http://schemas.openxmlformats.org/drawingml/2006/main" xmlns:r="http://schemas.openxmlformats.org/officeDocument/2006/relationships" xmlns:p="http://schemas.openxmlformats.org/presentationml/2006/main">
   <p:cSld>
-    <p:bg>
-      <p:bgPr>
-        <a:solidFill>
-          <a:schemeClr val="bg1"/>
-        </a:solidFill>
-        <a:effectLst/>
-      </p:bgPr>
-    </p:bg>
     <p:spTree>
       <p:nvGrpSpPr>
         <p:cNvPr id="1" name=""/>
@@ -5155,8 +5145,8 @@
           </a:prstGeom>
           <a:solidFill>
             <a:schemeClr val="bg1">
-              <a:lumMod val="85000"/>
-              <a:lumOff val="15000"/>
+              <a:lumMod val="95000"/>
+              <a:lumOff val="5000"/>
             </a:schemeClr>
           </a:solidFill>
           <a:ln>
@@ -7235,8 +7225,8 @@
           </a:prstGeom>
           <a:solidFill>
             <a:schemeClr val="bg1">
-              <a:lumMod val="85000"/>
-              <a:lumOff val="15000"/>
+              <a:lumMod val="95000"/>
+              <a:lumOff val="5000"/>
             </a:schemeClr>
           </a:solidFill>
           <a:ln>

</xml_diff>

<commit_message>
changed folder name & updated ppt
</commit_message>
<xml_diff>
--- a/vEB Allocation Framework.pptx
+++ b/vEB Allocation Framework.pptx
@@ -24516,35 +24516,73 @@
           <a:lstStyle/>
           <a:p>
             <a:r>
-              <a:rPr lang="en-US" sz="2200"/>
-              <a:t>van-Emde-Boas (vEB) trees are trees which maintain n elements in range {0,1,2….,u-1} and perform Insert, Delete, Successor and predecessor operations.</a:t>
+              <a:rPr lang="en-US" sz="2200" dirty="0"/>
+              <a:t>van-</a:t>
+            </a:r>
+            <a:r>
+              <a:rPr lang="en-US" sz="2200" dirty="0" err="1"/>
+              <a:t>Emde</a:t>
+            </a:r>
+            <a:r>
+              <a:rPr lang="en-US" sz="2200" dirty="0"/>
+              <a:t>-Boas (</a:t>
+            </a:r>
+            <a:r>
+              <a:rPr lang="en-US" sz="2200" dirty="0" err="1"/>
+              <a:t>vEB</a:t>
+            </a:r>
+            <a:r>
+              <a:rPr lang="en-US" sz="2200" dirty="0"/>
+              <a:t>) trees are trees which maintain n elements in range {0,1,2….,u-1} and perform Insert, Delete, Successor and predecessor operations.</a:t>
             </a:r>
           </a:p>
           <a:p>
+            <a:pPr marL="0" indent="0">
+              <a:buNone/>
+            </a:pPr>
+            <a:endParaRPr lang="en-US" sz="2200" dirty="0"/>
+          </a:p>
+          <a:p>
             <a:r>
-              <a:rPr lang="en-US" sz="2200"/>
-              <a:t>What is so special about vEB trees?</a:t>
+              <a:rPr lang="en-US" sz="2200" dirty="0"/>
+              <a:t>What is so special about </a:t>
+            </a:r>
+            <a:r>
+              <a:rPr lang="en-US" sz="2200" dirty="0" err="1"/>
+              <a:t>vEB</a:t>
+            </a:r>
+            <a:r>
+              <a:rPr lang="en-US" sz="2200" dirty="0"/>
+              <a:t> trees?</a:t>
             </a:r>
           </a:p>
           <a:p>
             <a:pPr lvl="1"/>
             <a:r>
-              <a:rPr lang="en-US" sz="2200"/>
+              <a:rPr lang="en-US" sz="2200" dirty="0"/>
               <a:t>Insert – O(1)</a:t>
             </a:r>
           </a:p>
           <a:p>
             <a:pPr lvl="1"/>
             <a:r>
-              <a:rPr lang="en-US" sz="2200"/>
+              <a:rPr lang="en-US" sz="2200" dirty="0"/>
               <a:t>Delete – O(1)</a:t>
             </a:r>
           </a:p>
           <a:p>
             <a:pPr lvl="1"/>
             <a:r>
-              <a:rPr lang="en-US" sz="2200"/>
-              <a:t>Successor &amp; Predecessor – O(log log u)</a:t>
+              <a:rPr lang="en-US" sz="2200" dirty="0"/>
+              <a:t>Successor &amp; Predecessor – O(log </a:t>
+            </a:r>
+            <a:r>
+              <a:rPr lang="en-US" sz="2200" dirty="0" err="1"/>
+              <a:t>log</a:t>
+            </a:r>
+            <a:r>
+              <a:rPr lang="en-US" sz="2200" dirty="0"/>
+              <a:t> u)</a:t>
             </a:r>
           </a:p>
         </p:txBody>
@@ -24654,9 +24692,7 @@
             </a:r>
           </a:p>
           <a:p>
-            <a:pPr marL="914400" lvl="1" indent="-457200">
-              <a:buAutoNum type="arabicPeriod"/>
-            </a:pPr>
+            <a:pPr lvl="1"/>
             <a:r>
               <a:rPr lang="en-AE" dirty="0"/>
               <a:t>Clusters</a:t>
@@ -33086,7 +33122,7 @@
         <p:spPr>
           <a:xfrm>
             <a:off x="1121286" y="3200252"/>
-            <a:ext cx="501286" cy="261610"/>
+            <a:ext cx="539874" cy="261610"/>
           </a:xfrm>
           <a:prstGeom prst="rect">
             <a:avLst/>
@@ -36349,7 +36385,7 @@
         <p:spPr>
           <a:xfrm>
             <a:off x="1121286" y="3200252"/>
-            <a:ext cx="501286" cy="261610"/>
+            <a:ext cx="547494" cy="261610"/>
           </a:xfrm>
           <a:prstGeom prst="rect">
             <a:avLst/>
@@ -39636,7 +39672,7 @@
         <p:spPr>
           <a:xfrm>
             <a:off x="1121286" y="3200252"/>
-            <a:ext cx="501286" cy="261610"/>
+            <a:ext cx="581784" cy="261610"/>
           </a:xfrm>
           <a:prstGeom prst="rect">
             <a:avLst/>
@@ -42921,7 +42957,7 @@
         <p:spPr>
           <a:xfrm>
             <a:off x="1121286" y="3200252"/>
-            <a:ext cx="501286" cy="261610"/>
+            <a:ext cx="543684" cy="261610"/>
           </a:xfrm>
           <a:prstGeom prst="rect">
             <a:avLst/>
@@ -46429,7 +46465,7 @@
         <p:spPr>
           <a:xfrm>
             <a:off x="1121286" y="3200252"/>
-            <a:ext cx="501286" cy="261610"/>
+            <a:ext cx="543684" cy="261610"/>
           </a:xfrm>
           <a:prstGeom prst="rect">
             <a:avLst/>

</xml_diff>